<commit_message>
Fix Logo and Mobile Home Page
</commit_message>
<xml_diff>
--- a/images/site/Images.pptx
+++ b/images/site/Images.pptx
@@ -11,6 +11,8 @@
     <p:sldId id="259" r:id="rId5"/>
     <p:sldId id="260" r:id="rId6"/>
     <p:sldId id="261" r:id="rId7"/>
+    <p:sldId id="262" r:id="rId8"/>
+    <p:sldId id="263" r:id="rId9"/>
   </p:sldIdLst>
   <p:sldSz cx="9144000" cy="6858000" type="screen4x3"/>
   <p:notesSz cx="6858000" cy="9144000"/>
@@ -262,7 +264,7 @@
           <a:p>
             <a:fld id="{E9AF1D58-07C2-DD40-A597-1364C0E081E7}" type="datetime1">
               <a:rPr lang="en-US" smtClean="0"/>
-              <a:t>4/4/17</a:t>
+              <a:t>4/5/17</a:t>
             </a:fld>
             <a:endParaRPr lang="en-US"/>
           </a:p>
@@ -432,7 +434,7 @@
           <a:p>
             <a:fld id="{33603646-B814-DD4B-ADD1-68B23377E2F3}" type="datetime1">
               <a:rPr lang="en-US" smtClean="0"/>
-              <a:t>4/4/17</a:t>
+              <a:t>4/5/17</a:t>
             </a:fld>
             <a:endParaRPr lang="en-US"/>
           </a:p>
@@ -612,7 +614,7 @@
           <a:p>
             <a:fld id="{C6889C94-AC88-854A-B230-8ECA51539F6E}" type="datetime1">
               <a:rPr lang="en-US" smtClean="0"/>
-              <a:t>4/4/17</a:t>
+              <a:t>4/5/17</a:t>
             </a:fld>
             <a:endParaRPr lang="en-US"/>
           </a:p>
@@ -795,7 +797,7 @@
           <a:p>
             <a:fld id="{B167A007-9015-C14B-B24C-F0C6208D097B}" type="datetime1">
               <a:rPr lang="en-US" smtClean="0"/>
-              <a:t>4/4/17</a:t>
+              <a:t>4/5/17</a:t>
             </a:fld>
             <a:endParaRPr lang="en-US"/>
           </a:p>
@@ -1079,7 +1081,7 @@
           <a:p>
             <a:fld id="{B167A007-9015-C14B-B24C-F0C6208D097B}" type="datetime1">
               <a:rPr lang="en-US" smtClean="0"/>
-              <a:t>4/4/17</a:t>
+              <a:t>4/5/17</a:t>
             </a:fld>
             <a:endParaRPr lang="en-US"/>
           </a:p>
@@ -1385,7 +1387,7 @@
           <a:p>
             <a:fld id="{2E96D910-8939-074B-ACCC-9D2090A869F1}" type="datetime1">
               <a:rPr lang="en-US" smtClean="0"/>
-              <a:t>4/4/17</a:t>
+              <a:t>4/5/17</a:t>
             </a:fld>
             <a:endParaRPr lang="en-US"/>
           </a:p>
@@ -1617,7 +1619,7 @@
           <a:p>
             <a:fld id="{108F0C15-6D0C-8744-BCCE-E5C07133BE3A}" type="datetime1">
               <a:rPr lang="en-US" smtClean="0"/>
-              <a:t>4/4/17</a:t>
+              <a:t>4/5/17</a:t>
             </a:fld>
             <a:endParaRPr lang="en-US"/>
           </a:p>
@@ -1984,7 +1986,7 @@
           <a:p>
             <a:fld id="{64FB1EE1-8C00-4E43-8707-C4970E0F9BA2}" type="datetime1">
               <a:rPr lang="en-US" smtClean="0"/>
-              <a:t>4/4/17</a:t>
+              <a:t>4/5/17</a:t>
             </a:fld>
             <a:endParaRPr lang="en-US"/>
           </a:p>
@@ -2102,7 +2104,7 @@
           <a:p>
             <a:fld id="{F913B5BD-E42C-4140-A536-5B49F3C07771}" type="datetime1">
               <a:rPr lang="en-US" smtClean="0"/>
-              <a:t>4/4/17</a:t>
+              <a:t>4/5/17</a:t>
             </a:fld>
             <a:endParaRPr lang="en-US"/>
           </a:p>
@@ -2197,7 +2199,7 @@
           <a:p>
             <a:fld id="{96E45739-91CF-7D4D-B9D9-6705485C4644}" type="datetime1">
               <a:rPr lang="en-US" smtClean="0"/>
-              <a:t>4/4/17</a:t>
+              <a:t>4/5/17</a:t>
             </a:fld>
             <a:endParaRPr lang="en-US"/>
           </a:p>
@@ -2474,7 +2476,7 @@
           <a:p>
             <a:fld id="{C309AAD0-E586-FD4C-B92E-CC8059D2D457}" type="datetime1">
               <a:rPr lang="en-US" smtClean="0"/>
-              <a:t>4/4/17</a:t>
+              <a:t>4/5/17</a:t>
             </a:fld>
             <a:endParaRPr lang="en-US"/>
           </a:p>
@@ -2731,7 +2733,7 @@
           <a:p>
             <a:fld id="{EA7457E7-C3FD-6347-9656-ECF91E8DABC0}" type="datetime1">
               <a:rPr lang="en-US" smtClean="0"/>
-              <a:t>4/4/17</a:t>
+              <a:t>4/5/17</a:t>
             </a:fld>
             <a:endParaRPr lang="en-US"/>
           </a:p>
@@ -2944,7 +2946,7 @@
           <a:p>
             <a:fld id="{D758F05F-EB83-524B-ACCA-097AD41CB0B9}" type="datetime1">
               <a:rPr lang="en-US" smtClean="0"/>
-              <a:t>4/4/17</a:t>
+              <a:t>4/5/17</a:t>
             </a:fld>
             <a:endParaRPr lang="en-US"/>
           </a:p>
@@ -25575,6 +25577,201 @@
 </p:sld>
 </file>
 
+<file path=ppt/slides/slide7.xml><?xml version="1.0" encoding="utf-8"?>
+<p:sld xmlns:a="http://schemas.openxmlformats.org/drawingml/2006/main" xmlns:r="http://schemas.openxmlformats.org/officeDocument/2006/relationships" xmlns:p="http://schemas.openxmlformats.org/presentationml/2006/main" showMasterSp="0">
+  <p:cSld>
+    <p:spTree>
+      <p:nvGrpSpPr>
+        <p:cNvPr id="1" name=""/>
+        <p:cNvGrpSpPr/>
+        <p:nvPr/>
+      </p:nvGrpSpPr>
+      <p:grpSpPr>
+        <a:xfrm>
+          <a:off x="0" y="0"/>
+          <a:ext cx="0" cy="0"/>
+          <a:chOff x="0" y="0"/>
+          <a:chExt cx="0" cy="0"/>
+        </a:xfrm>
+      </p:grpSpPr>
+      <p:sp>
+        <p:nvSpPr>
+          <p:cNvPr id="9" name="Rectangle 8"/>
+          <p:cNvSpPr/>
+          <p:nvPr/>
+        </p:nvSpPr>
+        <p:spPr>
+          <a:xfrm>
+            <a:off x="1350628" y="956345"/>
+            <a:ext cx="7642370" cy="3221372"/>
+          </a:xfrm>
+          <a:prstGeom prst="rect">
+            <a:avLst/>
+          </a:prstGeom>
+        </p:spPr>
+        <p:style>
+          <a:lnRef idx="2">
+            <a:schemeClr val="accent1">
+              <a:shade val="50000"/>
+            </a:schemeClr>
+          </a:lnRef>
+          <a:fillRef idx="1">
+            <a:schemeClr val="accent1"/>
+          </a:fillRef>
+          <a:effectRef idx="0">
+            <a:schemeClr val="accent1"/>
+          </a:effectRef>
+          <a:fontRef idx="minor">
+            <a:schemeClr val="lt1"/>
+          </a:fontRef>
+        </p:style>
+        <p:txBody>
+          <a:bodyPr rtlCol="0" anchor="ctr"/>
+          <a:lstStyle/>
+          <a:p>
+            <a:pPr algn="ctr"/>
+            <a:endParaRPr lang="en-US"/>
+          </a:p>
+        </p:txBody>
+      </p:sp>
+      <p:pic>
+        <p:nvPicPr>
+          <p:cNvPr id="5" name="Picture 4"/>
+          <p:cNvPicPr>
+            <a:picLocks noChangeAspect="1"/>
+          </p:cNvPicPr>
+          <p:nvPr/>
+        </p:nvPicPr>
+        <p:blipFill>
+          <a:blip r:embed="rId2">
+            <a:clrChange>
+              <a:clrFrom>
+                <a:srgbClr val="FFFFFF"/>
+              </a:clrFrom>
+              <a:clrTo>
+                <a:srgbClr val="FFFFFF">
+                  <a:alpha val="0"/>
+                </a:srgbClr>
+              </a:clrTo>
+            </a:clrChange>
+          </a:blip>
+          <a:stretch>
+            <a:fillRect/>
+          </a:stretch>
+        </p:blipFill>
+        <p:spPr>
+          <a:xfrm>
+            <a:off x="5521488" y="1992525"/>
+            <a:ext cx="1580284" cy="1136785"/>
+          </a:xfrm>
+          <a:prstGeom prst="rect">
+            <a:avLst/>
+          </a:prstGeom>
+        </p:spPr>
+      </p:pic>
+      <p:sp>
+        <p:nvSpPr>
+          <p:cNvPr id="6" name="TextBox 5"/>
+          <p:cNvSpPr txBox="1"/>
+          <p:nvPr/>
+        </p:nvSpPr>
+        <p:spPr>
+          <a:xfrm>
+            <a:off x="2718033" y="1929975"/>
+            <a:ext cx="3989411" cy="1261884"/>
+          </a:xfrm>
+          <a:prstGeom prst="rect">
+            <a:avLst/>
+          </a:prstGeom>
+          <a:noFill/>
+        </p:spPr>
+        <p:txBody>
+          <a:bodyPr wrap="square" rtlCol="0">
+            <a:spAutoFit/>
+          </a:bodyPr>
+          <a:lstStyle/>
+          <a:p>
+            <a:pPr algn="ctr"/>
+            <a:r>
+              <a:rPr lang="en-US" sz="3700" dirty="0">
+                <a:solidFill>
+                  <a:schemeClr val="bg1"/>
+                </a:solidFill>
+                <a:latin typeface="Helvetica" panose="020B0604020202020204" pitchFamily="34" charset="0"/>
+                <a:cs typeface="Helvetica" panose="020B0604020202020204" pitchFamily="34" charset="0"/>
+              </a:rPr>
+              <a:t>Peters Research Group</a:t>
+            </a:r>
+          </a:p>
+        </p:txBody>
+      </p:sp>
+    </p:spTree>
+    <p:extLst>
+      <p:ext uri="{BB962C8B-B14F-4D97-AF65-F5344CB8AC3E}">
+        <p14:creationId xmlns:p14="http://schemas.microsoft.com/office/powerpoint/2010/main" val="2046063681"/>
+      </p:ext>
+    </p:extLst>
+  </p:cSld>
+  <p:clrMapOvr>
+    <a:masterClrMapping/>
+  </p:clrMapOvr>
+</p:sld>
+</file>
+
+<file path=ppt/slides/slide8.xml><?xml version="1.0" encoding="utf-8"?>
+<p:sld xmlns:a="http://schemas.openxmlformats.org/drawingml/2006/main" xmlns:r="http://schemas.openxmlformats.org/officeDocument/2006/relationships" xmlns:p="http://schemas.openxmlformats.org/presentationml/2006/main" showMasterSp="0">
+  <p:cSld>
+    <p:spTree>
+      <p:nvGrpSpPr>
+        <p:cNvPr id="1" name=""/>
+        <p:cNvGrpSpPr/>
+        <p:nvPr/>
+      </p:nvGrpSpPr>
+      <p:grpSpPr>
+        <a:xfrm>
+          <a:off x="0" y="0"/>
+          <a:ext cx="0" cy="0"/>
+          <a:chOff x="0" y="0"/>
+          <a:chExt cx="0" cy="0"/>
+        </a:xfrm>
+      </p:grpSpPr>
+      <p:pic>
+        <p:nvPicPr>
+          <p:cNvPr id="5" name="Picture 4"/>
+          <p:cNvPicPr>
+            <a:picLocks noChangeAspect="1"/>
+          </p:cNvPicPr>
+          <p:nvPr/>
+        </p:nvPicPr>
+        <p:blipFill>
+          <a:blip r:embed="rId2"/>
+          <a:stretch>
+            <a:fillRect/>
+          </a:stretch>
+        </p:blipFill>
+        <p:spPr>
+          <a:xfrm>
+            <a:off x="571500" y="1903476"/>
+            <a:ext cx="8001000" cy="3051048"/>
+          </a:xfrm>
+          <a:prstGeom prst="rect">
+            <a:avLst/>
+          </a:prstGeom>
+        </p:spPr>
+      </p:pic>
+    </p:spTree>
+    <p:extLst>
+      <p:ext uri="{BB962C8B-B14F-4D97-AF65-F5344CB8AC3E}">
+        <p14:creationId xmlns:p14="http://schemas.microsoft.com/office/powerpoint/2010/main" val="868822749"/>
+      </p:ext>
+    </p:extLst>
+  </p:cSld>
+  <p:clrMapOvr>
+    <a:masterClrMapping/>
+  </p:clrMapOvr>
+</p:sld>
+</file>
+
 <file path=ppt/theme/theme1.xml><?xml version="1.0" encoding="utf-8"?>
 <a:theme xmlns:a="http://schemas.openxmlformats.org/drawingml/2006/main" name="Minnesota2">
   <a:themeElements>

</xml_diff>

<commit_message>
Logo and Color Update
</commit_message>
<xml_diff>
--- a/images/site/Images.pptx
+++ b/images/site/Images.pptx
@@ -12,7 +12,8 @@
     <p:sldId id="260" r:id="rId6"/>
     <p:sldId id="261" r:id="rId7"/>
     <p:sldId id="262" r:id="rId8"/>
-    <p:sldId id="263" r:id="rId9"/>
+    <p:sldId id="264" r:id="rId9"/>
+    <p:sldId id="263" r:id="rId10"/>
   </p:sldIdLst>
   <p:sldSz cx="9144000" cy="6858000" type="screen4x3"/>
   <p:notesSz cx="6858000" cy="9144000"/>
@@ -264,7 +265,7 @@
           <a:p>
             <a:fld id="{E9AF1D58-07C2-DD40-A597-1364C0E081E7}" type="datetime1">
               <a:rPr lang="en-US" smtClean="0"/>
-              <a:t>4/5/17</a:t>
+              <a:t>4/16/17</a:t>
             </a:fld>
             <a:endParaRPr lang="en-US"/>
           </a:p>
@@ -434,7 +435,7 @@
           <a:p>
             <a:fld id="{33603646-B814-DD4B-ADD1-68B23377E2F3}" type="datetime1">
               <a:rPr lang="en-US" smtClean="0"/>
-              <a:t>4/5/17</a:t>
+              <a:t>4/16/17</a:t>
             </a:fld>
             <a:endParaRPr lang="en-US"/>
           </a:p>
@@ -614,7 +615,7 @@
           <a:p>
             <a:fld id="{C6889C94-AC88-854A-B230-8ECA51539F6E}" type="datetime1">
               <a:rPr lang="en-US" smtClean="0"/>
-              <a:t>4/5/17</a:t>
+              <a:t>4/16/17</a:t>
             </a:fld>
             <a:endParaRPr lang="en-US"/>
           </a:p>
@@ -797,7 +798,7 @@
           <a:p>
             <a:fld id="{B167A007-9015-C14B-B24C-F0C6208D097B}" type="datetime1">
               <a:rPr lang="en-US" smtClean="0"/>
-              <a:t>4/5/17</a:t>
+              <a:t>4/16/17</a:t>
             </a:fld>
             <a:endParaRPr lang="en-US"/>
           </a:p>
@@ -1081,7 +1082,7 @@
           <a:p>
             <a:fld id="{B167A007-9015-C14B-B24C-F0C6208D097B}" type="datetime1">
               <a:rPr lang="en-US" smtClean="0"/>
-              <a:t>4/5/17</a:t>
+              <a:t>4/16/17</a:t>
             </a:fld>
             <a:endParaRPr lang="en-US"/>
           </a:p>
@@ -1387,7 +1388,7 @@
           <a:p>
             <a:fld id="{2E96D910-8939-074B-ACCC-9D2090A869F1}" type="datetime1">
               <a:rPr lang="en-US" smtClean="0"/>
-              <a:t>4/5/17</a:t>
+              <a:t>4/16/17</a:t>
             </a:fld>
             <a:endParaRPr lang="en-US"/>
           </a:p>
@@ -1619,7 +1620,7 @@
           <a:p>
             <a:fld id="{108F0C15-6D0C-8744-BCCE-E5C07133BE3A}" type="datetime1">
               <a:rPr lang="en-US" smtClean="0"/>
-              <a:t>4/5/17</a:t>
+              <a:t>4/16/17</a:t>
             </a:fld>
             <a:endParaRPr lang="en-US"/>
           </a:p>
@@ -1986,7 +1987,7 @@
           <a:p>
             <a:fld id="{64FB1EE1-8C00-4E43-8707-C4970E0F9BA2}" type="datetime1">
               <a:rPr lang="en-US" smtClean="0"/>
-              <a:t>4/5/17</a:t>
+              <a:t>4/16/17</a:t>
             </a:fld>
             <a:endParaRPr lang="en-US"/>
           </a:p>
@@ -2104,7 +2105,7 @@
           <a:p>
             <a:fld id="{F913B5BD-E42C-4140-A536-5B49F3C07771}" type="datetime1">
               <a:rPr lang="en-US" smtClean="0"/>
-              <a:t>4/5/17</a:t>
+              <a:t>4/16/17</a:t>
             </a:fld>
             <a:endParaRPr lang="en-US"/>
           </a:p>
@@ -2199,7 +2200,7 @@
           <a:p>
             <a:fld id="{96E45739-91CF-7D4D-B9D9-6705485C4644}" type="datetime1">
               <a:rPr lang="en-US" smtClean="0"/>
-              <a:t>4/5/17</a:t>
+              <a:t>4/16/17</a:t>
             </a:fld>
             <a:endParaRPr lang="en-US"/>
           </a:p>
@@ -2476,7 +2477,7 @@
           <a:p>
             <a:fld id="{C309AAD0-E586-FD4C-B92E-CC8059D2D457}" type="datetime1">
               <a:rPr lang="en-US" smtClean="0"/>
-              <a:t>4/5/17</a:t>
+              <a:t>4/16/17</a:t>
             </a:fld>
             <a:endParaRPr lang="en-US"/>
           </a:p>
@@ -2733,7 +2734,7 @@
           <a:p>
             <a:fld id="{EA7457E7-C3FD-6347-9656-ECF91E8DABC0}" type="datetime1">
               <a:rPr lang="en-US" smtClean="0"/>
-              <a:t>4/5/17</a:t>
+              <a:t>4/16/17</a:t>
             </a:fld>
             <a:endParaRPr lang="en-US"/>
           </a:p>
@@ -2946,7 +2947,7 @@
           <a:p>
             <a:fld id="{D758F05F-EB83-524B-ACCA-097AD41CB0B9}" type="datetime1">
               <a:rPr lang="en-US" smtClean="0"/>
-              <a:t>4/5/17</a:t>
+              <a:t>4/16/17</a:t>
             </a:fld>
             <a:endParaRPr lang="en-US"/>
           </a:p>
@@ -25735,6 +25736,194 @@
           <a:chExt cx="0" cy="0"/>
         </a:xfrm>
       </p:grpSpPr>
+      <p:sp>
+        <p:nvSpPr>
+          <p:cNvPr id="9" name="Rectangle 8"/>
+          <p:cNvSpPr/>
+          <p:nvPr/>
+        </p:nvSpPr>
+        <p:spPr>
+          <a:xfrm>
+            <a:off x="-814551" y="420317"/>
+            <a:ext cx="9339839" cy="3221372"/>
+          </a:xfrm>
+          <a:prstGeom prst="rect">
+            <a:avLst/>
+          </a:prstGeom>
+        </p:spPr>
+        <p:style>
+          <a:lnRef idx="2">
+            <a:schemeClr val="accent1">
+              <a:shade val="50000"/>
+            </a:schemeClr>
+          </a:lnRef>
+          <a:fillRef idx="1">
+            <a:schemeClr val="accent1"/>
+          </a:fillRef>
+          <a:effectRef idx="0">
+            <a:schemeClr val="accent1"/>
+          </a:effectRef>
+          <a:fontRef idx="minor">
+            <a:schemeClr val="lt1"/>
+          </a:fontRef>
+        </p:style>
+        <p:txBody>
+          <a:bodyPr rtlCol="0" anchor="ctr"/>
+          <a:lstStyle/>
+          <a:p>
+            <a:pPr algn="ctr"/>
+            <a:endParaRPr lang="en-US"/>
+          </a:p>
+        </p:txBody>
+      </p:sp>
+      <p:sp>
+        <p:nvSpPr>
+          <p:cNvPr id="6" name="TextBox 5"/>
+          <p:cNvSpPr txBox="1"/>
+          <p:nvPr/>
+        </p:nvSpPr>
+        <p:spPr>
+          <a:xfrm>
+            <a:off x="1553497" y="715258"/>
+            <a:ext cx="7863772" cy="2631490"/>
+          </a:xfrm>
+          <a:prstGeom prst="rect">
+            <a:avLst/>
+          </a:prstGeom>
+          <a:noFill/>
+        </p:spPr>
+        <p:txBody>
+          <a:bodyPr wrap="square" rtlCol="0">
+            <a:spAutoFit/>
+          </a:bodyPr>
+          <a:lstStyle/>
+          <a:p>
+            <a:r>
+              <a:rPr lang="en-US" sz="5500" dirty="0">
+                <a:solidFill>
+                  <a:schemeClr val="bg1"/>
+                </a:solidFill>
+                <a:latin typeface="Helvetica" panose="020B0604020202020204" pitchFamily="34" charset="0"/>
+                <a:cs typeface="Helvetica" panose="020B0604020202020204" pitchFamily="34" charset="0"/>
+              </a:rPr>
+              <a:t>Peters </a:t>
+            </a:r>
+          </a:p>
+          <a:p>
+            <a:r>
+              <a:rPr lang="en-US" sz="5500" dirty="0">
+                <a:solidFill>
+                  <a:schemeClr val="bg1"/>
+                </a:solidFill>
+                <a:latin typeface="Helvetica" panose="020B0604020202020204" pitchFamily="34" charset="0"/>
+                <a:cs typeface="Helvetica" panose="020B0604020202020204" pitchFamily="34" charset="0"/>
+              </a:rPr>
+              <a:t>     Research </a:t>
+            </a:r>
+          </a:p>
+          <a:p>
+            <a:r>
+              <a:rPr lang="en-US" sz="5500" dirty="0">
+                <a:solidFill>
+                  <a:schemeClr val="bg1"/>
+                </a:solidFill>
+                <a:latin typeface="Helvetica" panose="020B0604020202020204" pitchFamily="34" charset="0"/>
+                <a:cs typeface="Helvetica" panose="020B0604020202020204" pitchFamily="34" charset="0"/>
+              </a:rPr>
+              <a:t>          Group</a:t>
+            </a:r>
+          </a:p>
+        </p:txBody>
+      </p:sp>
+      <p:pic>
+        <p:nvPicPr>
+          <p:cNvPr id="5" name="Picture 4"/>
+          <p:cNvPicPr>
+            <a:picLocks noChangeAspect="1"/>
+          </p:cNvPicPr>
+          <p:nvPr/>
+        </p:nvPicPr>
+        <p:blipFill>
+          <a:blip r:embed="rId2">
+            <a:clrChange>
+              <a:clrFrom>
+                <a:srgbClr val="FFFFFF"/>
+              </a:clrFrom>
+              <a:clrTo>
+                <a:srgbClr val="FFFFFF">
+                  <a:alpha val="0"/>
+                </a:srgbClr>
+              </a:clrTo>
+            </a:clrChange>
+          </a:blip>
+          <a:stretch>
+            <a:fillRect/>
+          </a:stretch>
+        </p:blipFill>
+        <p:spPr>
+          <a:xfrm rot="3453938">
+            <a:off x="530575" y="1310223"/>
+            <a:ext cx="3102249" cy="2231618"/>
+          </a:xfrm>
+          <a:prstGeom prst="rect">
+            <a:avLst/>
+          </a:prstGeom>
+        </p:spPr>
+      </p:pic>
+      <p:pic>
+        <p:nvPicPr>
+          <p:cNvPr id="2" name="Picture 1"/>
+          <p:cNvPicPr>
+            <a:picLocks noChangeAspect="1"/>
+          </p:cNvPicPr>
+          <p:nvPr/>
+        </p:nvPicPr>
+        <p:blipFill>
+          <a:blip r:embed="rId3"/>
+          <a:stretch>
+            <a:fillRect/>
+          </a:stretch>
+        </p:blipFill>
+        <p:spPr>
+          <a:xfrm>
+            <a:off x="973356" y="4795509"/>
+            <a:ext cx="1343025" cy="714375"/>
+          </a:xfrm>
+          <a:prstGeom prst="rect">
+            <a:avLst/>
+          </a:prstGeom>
+        </p:spPr>
+      </p:pic>
+    </p:spTree>
+    <p:extLst>
+      <p:ext uri="{BB962C8B-B14F-4D97-AF65-F5344CB8AC3E}">
+        <p14:creationId xmlns:p14="http://schemas.microsoft.com/office/powerpoint/2010/main" val="786879941"/>
+      </p:ext>
+    </p:extLst>
+  </p:cSld>
+  <p:clrMapOvr>
+    <a:masterClrMapping/>
+  </p:clrMapOvr>
+</p:sld>
+</file>
+
+<file path=ppt/slides/slide9.xml><?xml version="1.0" encoding="utf-8"?>
+<p:sld xmlns:a="http://schemas.openxmlformats.org/drawingml/2006/main" xmlns:r="http://schemas.openxmlformats.org/officeDocument/2006/relationships" xmlns:p="http://schemas.openxmlformats.org/presentationml/2006/main" showMasterSp="0">
+  <p:cSld>
+    <p:spTree>
+      <p:nvGrpSpPr>
+        <p:cNvPr id="1" name=""/>
+        <p:cNvGrpSpPr/>
+        <p:nvPr/>
+      </p:nvGrpSpPr>
+      <p:grpSpPr>
+        <a:xfrm>
+          <a:off x="0" y="0"/>
+          <a:ext cx="0" cy="0"/>
+          <a:chOff x="0" y="0"/>
+          <a:chExt cx="0" cy="0"/>
+        </a:xfrm>
+      </p:grpSpPr>
       <p:pic>
         <p:nvPicPr>
           <p:cNvPr id="5" name="Picture 4"/>

</xml_diff>